<commit_message>
Material de fundamentos de c#
</commit_message>
<xml_diff>
--- a/#00 - Material de Apoio/00 - Fundamentos de C#/01 - C#/PPTs/01 - C#.pptx
+++ b/#00 - Material de Apoio/00 - Fundamentos de C#/01 - C#/PPTs/01 - C#.pptx
@@ -5,7 +5,7 @@
     <p:sldMasterId id="2147483648" r:id="rId1"/>
   </p:sldMasterIdLst>
   <p:notesMasterIdLst>
-    <p:notesMasterId r:id="rId13"/>
+    <p:notesMasterId r:id="rId12"/>
   </p:notesMasterIdLst>
   <p:sldIdLst>
     <p:sldId id="256" r:id="rId2"/>
@@ -13,12 +13,11 @@
     <p:sldId id="261" r:id="rId4"/>
     <p:sldId id="262" r:id="rId5"/>
     <p:sldId id="263" r:id="rId6"/>
-    <p:sldId id="264" r:id="rId7"/>
-    <p:sldId id="265" r:id="rId8"/>
-    <p:sldId id="266" r:id="rId9"/>
-    <p:sldId id="267" r:id="rId10"/>
-    <p:sldId id="268" r:id="rId11"/>
-    <p:sldId id="260" r:id="rId12"/>
+    <p:sldId id="265" r:id="rId7"/>
+    <p:sldId id="266" r:id="rId8"/>
+    <p:sldId id="267" r:id="rId9"/>
+    <p:sldId id="268" r:id="rId10"/>
+    <p:sldId id="260" r:id="rId11"/>
   </p:sldIdLst>
   <p:sldSz cx="18288000" cy="10287000"/>
   <p:notesSz cx="18288000" cy="10287000"/>
@@ -202,7 +201,7 @@
           <a:p>
             <a:fld id="{139EEEC3-02C9-4141-B0CF-4C776CBE4D81}" type="datetimeFigureOut">
               <a:rPr lang="pt-BR" smtClean="0"/>
-              <a:t>13/03/2021</a:t>
+              <a:t>18/03/2021</a:t>
             </a:fld>
             <a:endParaRPr lang="pt-BR"/>
           </a:p>
@@ -609,7 +608,7 @@
           <a:p>
             <a:fld id="{1D8BD707-D9CF-40AE-B4C6-C98DA3205C09}" type="datetimeFigureOut">
               <a:rPr lang="en-US"/>
-              <a:t>3/13/2021</a:t>
+              <a:t>3/18/2021</a:t>
             </a:fld>
             <a:endParaRPr lang="en-US"/>
           </a:p>
@@ -780,7 +779,7 @@
           <a:p>
             <a:fld id="{1D8BD707-D9CF-40AE-B4C6-C98DA3205C09}" type="datetimeFigureOut">
               <a:rPr lang="en-US"/>
-              <a:t>3/13/2021</a:t>
+              <a:t>3/18/2021</a:t>
             </a:fld>
             <a:endParaRPr lang="en-US"/>
           </a:p>
@@ -994,7 +993,7 @@
           <a:p>
             <a:fld id="{1D8BD707-D9CF-40AE-B4C6-C98DA3205C09}" type="datetimeFigureOut">
               <a:rPr lang="en-US"/>
-              <a:t>3/13/2021</a:t>
+              <a:t>3/18/2021</a:t>
             </a:fld>
             <a:endParaRPr lang="en-US"/>
           </a:p>
@@ -1237,7 +1236,7 @@
           <a:p>
             <a:fld id="{1D8BD707-D9CF-40AE-B4C6-C98DA3205C09}" type="datetimeFigureOut">
               <a:rPr lang="en-US"/>
-              <a:t>3/13/2021</a:t>
+              <a:t>3/18/2021</a:t>
             </a:fld>
             <a:endParaRPr lang="en-US"/>
           </a:p>
@@ -1356,7 +1355,7 @@
           <a:p>
             <a:fld id="{1D8BD707-D9CF-40AE-B4C6-C98DA3205C09}" type="datetimeFigureOut">
               <a:rPr lang="en-US"/>
-              <a:t>3/13/2021</a:t>
+              <a:t>3/18/2021</a:t>
             </a:fld>
             <a:endParaRPr lang="en-US"/>
           </a:p>
@@ -1691,7 +1690,7 @@
           <a:p>
             <a:fld id="{1D8BD707-D9CF-40AE-B4C6-C98DA3205C09}" type="datetimeFigureOut">
               <a:rPr lang="en-US"/>
-              <a:t>3/13/2021</a:t>
+              <a:t>3/18/2021</a:t>
             </a:fld>
             <a:endParaRPr lang="en-US"/>
           </a:p>
@@ -2174,418 +2173,6 @@
       </p:grpSpPr>
       <p:sp>
         <p:nvSpPr>
-          <p:cNvPr id="59" name="object 5"/>
-          <p:cNvSpPr/>
-          <p:nvPr/>
-        </p:nvSpPr>
-        <p:spPr>
-          <a:xfrm>
-            <a:off x="838200" y="1943101"/>
-            <a:ext cx="16687800" cy="6629400"/>
-          </a:xfrm>
-          <a:custGeom>
-            <a:avLst/>
-            <a:gdLst/>
-            <a:ahLst/>
-            <a:cxnLst/>
-            <a:rect l="l" t="t" r="r" b="b"/>
-            <a:pathLst>
-              <a:path w="8507094" h="2987040">
-                <a:moveTo>
-                  <a:pt x="8009128" y="0"/>
-                </a:moveTo>
-                <a:lnTo>
-                  <a:pt x="0" y="0"/>
-                </a:lnTo>
-                <a:lnTo>
-                  <a:pt x="0" y="2987040"/>
-                </a:lnTo>
-                <a:lnTo>
-                  <a:pt x="8009128" y="2987040"/>
-                </a:lnTo>
-                <a:lnTo>
-                  <a:pt x="8057074" y="2984761"/>
-                </a:lnTo>
-                <a:lnTo>
-                  <a:pt x="8103730" y="2978063"/>
-                </a:lnTo>
-                <a:lnTo>
-                  <a:pt x="8148889" y="2967155"/>
-                </a:lnTo>
-                <a:lnTo>
-                  <a:pt x="8192340" y="2952246"/>
-                </a:lnTo>
-                <a:lnTo>
-                  <a:pt x="8233876" y="2933543"/>
-                </a:lnTo>
-                <a:lnTo>
-                  <a:pt x="8273288" y="2911257"/>
-                </a:lnTo>
-                <a:lnTo>
-                  <a:pt x="8310367" y="2885594"/>
-                </a:lnTo>
-                <a:lnTo>
-                  <a:pt x="8344905" y="2856765"/>
-                </a:lnTo>
-                <a:lnTo>
-                  <a:pt x="8376693" y="2824977"/>
-                </a:lnTo>
-                <a:lnTo>
-                  <a:pt x="8405522" y="2790439"/>
-                </a:lnTo>
-                <a:lnTo>
-                  <a:pt x="8431185" y="2753360"/>
-                </a:lnTo>
-                <a:lnTo>
-                  <a:pt x="8453471" y="2713948"/>
-                </a:lnTo>
-                <a:lnTo>
-                  <a:pt x="8472174" y="2672412"/>
-                </a:lnTo>
-                <a:lnTo>
-                  <a:pt x="8487083" y="2628961"/>
-                </a:lnTo>
-                <a:lnTo>
-                  <a:pt x="8497991" y="2583802"/>
-                </a:lnTo>
-                <a:lnTo>
-                  <a:pt x="8504689" y="2537146"/>
-                </a:lnTo>
-                <a:lnTo>
-                  <a:pt x="8506968" y="2489200"/>
-                </a:lnTo>
-                <a:lnTo>
-                  <a:pt x="8506968" y="497840"/>
-                </a:lnTo>
-                <a:lnTo>
-                  <a:pt x="8504689" y="449893"/>
-                </a:lnTo>
-                <a:lnTo>
-                  <a:pt x="8497991" y="403237"/>
-                </a:lnTo>
-                <a:lnTo>
-                  <a:pt x="8487083" y="358078"/>
-                </a:lnTo>
-                <a:lnTo>
-                  <a:pt x="8472174" y="314627"/>
-                </a:lnTo>
-                <a:lnTo>
-                  <a:pt x="8453471" y="273091"/>
-                </a:lnTo>
-                <a:lnTo>
-                  <a:pt x="8431185" y="233679"/>
-                </a:lnTo>
-                <a:lnTo>
-                  <a:pt x="8405522" y="196600"/>
-                </a:lnTo>
-                <a:lnTo>
-                  <a:pt x="8376693" y="162062"/>
-                </a:lnTo>
-                <a:lnTo>
-                  <a:pt x="8344905" y="130274"/>
-                </a:lnTo>
-                <a:lnTo>
-                  <a:pt x="8310367" y="101445"/>
-                </a:lnTo>
-                <a:lnTo>
-                  <a:pt x="8273288" y="75782"/>
-                </a:lnTo>
-                <a:lnTo>
-                  <a:pt x="8233876" y="53496"/>
-                </a:lnTo>
-                <a:lnTo>
-                  <a:pt x="8192340" y="34793"/>
-                </a:lnTo>
-                <a:lnTo>
-                  <a:pt x="8148889" y="19884"/>
-                </a:lnTo>
-                <a:lnTo>
-                  <a:pt x="8103730" y="8976"/>
-                </a:lnTo>
-                <a:lnTo>
-                  <a:pt x="8057074" y="2278"/>
-                </a:lnTo>
-                <a:lnTo>
-                  <a:pt x="8009128" y="0"/>
-                </a:lnTo>
-                <a:close/>
-              </a:path>
-            </a:pathLst>
-          </a:custGeom>
-        </p:spPr>
-        <p:style>
-          <a:lnRef idx="2">
-            <a:schemeClr val="accent3"/>
-          </a:lnRef>
-          <a:fillRef idx="1">
-            <a:schemeClr val="lt1"/>
-          </a:fillRef>
-          <a:effectRef idx="0">
-            <a:schemeClr val="accent3"/>
-          </a:effectRef>
-          <a:fontRef idx="minor">
-            <a:schemeClr val="dk1"/>
-          </a:fontRef>
-        </p:style>
-        <p:txBody>
-          <a:bodyPr wrap="square" lIns="0" tIns="0" rIns="0" bIns="0" rtlCol="0"/>
-          <a:lstStyle/>
-          <a:p>
-            <a:endParaRPr/>
-          </a:p>
-        </p:txBody>
-      </p:sp>
-      <p:sp>
-        <p:nvSpPr>
-          <p:cNvPr id="61" name="object 28"/>
-          <p:cNvSpPr txBox="1">
-            <a:spLocks/>
-          </p:cNvSpPr>
-          <p:nvPr/>
-        </p:nvSpPr>
-        <p:spPr>
-          <a:xfrm>
-            <a:off x="838200" y="706068"/>
-            <a:ext cx="13715899" cy="943848"/>
-          </a:xfrm>
-          <a:prstGeom prst="rect">
-            <a:avLst/>
-          </a:prstGeom>
-        </p:spPr>
-        <p:txBody>
-          <a:bodyPr vert="horz" wrap="square" lIns="0" tIns="12700" rIns="0" bIns="0" rtlCol="0">
-            <a:spAutoFit/>
-          </a:bodyPr>
-          <a:lstStyle>
-            <a:lvl1pPr>
-              <a:defRPr sz="12200" b="0" i="0">
-                <a:solidFill>
-                  <a:schemeClr val="bg1"/>
-                </a:solidFill>
-                <a:latin typeface="Lucida Sans Unicode"/>
-                <a:ea typeface="+mj-ea"/>
-                <a:cs typeface="Lucida Sans Unicode"/>
-              </a:defRPr>
-            </a:lvl1pPr>
-          </a:lstStyle>
-          <a:p>
-            <a:pPr marL="12700">
-              <a:spcBef>
-                <a:spcPts val="100"/>
-              </a:spcBef>
-            </a:pPr>
-            <a:r>
-              <a:rPr lang="pt-BR" sz="6050" b="1" kern="0" spc="270" dirty="0">
-                <a:solidFill>
-                  <a:srgbClr val="69EB00"/>
-                </a:solidFill>
-                <a:latin typeface="Arial"/>
-                <a:cs typeface="Arial"/>
-              </a:rPr>
-              <a:t>Por que utilizar C</a:t>
-            </a:r>
-            <a:r>
-              <a:rPr lang="pt-BR" sz="6050" b="1" kern="0" spc="270" dirty="0" smtClean="0">
-                <a:solidFill>
-                  <a:srgbClr val="69EB00"/>
-                </a:solidFill>
-                <a:latin typeface="Arial"/>
-                <a:cs typeface="Arial"/>
-              </a:rPr>
-              <a:t>#?</a:t>
-            </a:r>
-            <a:endParaRPr lang="pt-BR" sz="6050" kern="0" dirty="0">
-              <a:latin typeface="Arial"/>
-              <a:cs typeface="Arial"/>
-            </a:endParaRPr>
-          </a:p>
-        </p:txBody>
-      </p:sp>
-      <p:sp>
-        <p:nvSpPr>
-          <p:cNvPr id="5" name="object 7"/>
-          <p:cNvSpPr txBox="1">
-            <a:spLocks/>
-          </p:cNvSpPr>
-          <p:nvPr/>
-        </p:nvSpPr>
-        <p:spPr>
-          <a:xfrm>
-            <a:off x="1179677" y="2247900"/>
-            <a:ext cx="15559939" cy="3005310"/>
-          </a:xfrm>
-          <a:prstGeom prst="rect">
-            <a:avLst/>
-          </a:prstGeom>
-        </p:spPr>
-        <p:txBody>
-          <a:bodyPr vert="horz" wrap="square" lIns="0" tIns="12065" rIns="0" bIns="0" rtlCol="0">
-            <a:spAutoFit/>
-          </a:bodyPr>
-          <a:lstStyle>
-            <a:lvl1pPr>
-              <a:defRPr sz="12200" b="0" i="0">
-                <a:solidFill>
-                  <a:schemeClr val="bg1"/>
-                </a:solidFill>
-                <a:latin typeface="Lucida Sans Unicode"/>
-                <a:ea typeface="+mj-ea"/>
-                <a:cs typeface="Lucida Sans Unicode"/>
-              </a:defRPr>
-            </a:lvl1pPr>
-          </a:lstStyle>
-          <a:p>
-            <a:pPr marL="584200" indent="-571500" algn="just">
-              <a:spcBef>
-                <a:spcPts val="95"/>
-              </a:spcBef>
-              <a:buFont typeface="Wingdings" panose="05000000000000000000" pitchFamily="2" charset="2"/>
-              <a:buChar char="§"/>
-            </a:pPr>
-            <a:r>
-              <a:rPr lang="pt-BR" sz="4000" b="1" kern="0" spc="180" dirty="0">
-                <a:solidFill>
-                  <a:srgbClr val="92D050"/>
-                </a:solidFill>
-                <a:latin typeface="Arial"/>
-                <a:cs typeface="Arial"/>
-              </a:rPr>
-              <a:t>Muitos lugares para aprender:</a:t>
-            </a:r>
-          </a:p>
-          <a:p>
-            <a:pPr marL="584200" indent="-571500" algn="just">
-              <a:spcBef>
-                <a:spcPts val="95"/>
-              </a:spcBef>
-              <a:buFont typeface="Wingdings" panose="05000000000000000000" pitchFamily="2" charset="2"/>
-              <a:buChar char="§"/>
-            </a:pPr>
-            <a:r>
-              <a:rPr lang="pt-BR" sz="4000" b="1" kern="0" spc="180" dirty="0">
-                <a:solidFill>
-                  <a:schemeClr val="tx1"/>
-                </a:solidFill>
-                <a:latin typeface="Arial"/>
-                <a:cs typeface="Arial"/>
-              </a:rPr>
-              <a:t>Você pode começar a estudar C# em vários lugares diferentes, de graça. </a:t>
-            </a:r>
-            <a:endParaRPr lang="pt-BR" sz="4000" b="1" kern="0" spc="180" dirty="0" smtClean="0">
-              <a:solidFill>
-                <a:schemeClr val="tx1"/>
-              </a:solidFill>
-              <a:latin typeface="Arial"/>
-              <a:cs typeface="Arial"/>
-            </a:endParaRPr>
-          </a:p>
-          <a:p>
-            <a:pPr marL="584200" indent="-571500" algn="just">
-              <a:spcBef>
-                <a:spcPts val="95"/>
-              </a:spcBef>
-              <a:buFont typeface="Wingdings" panose="05000000000000000000" pitchFamily="2" charset="2"/>
-              <a:buChar char="§"/>
-            </a:pPr>
-            <a:r>
-              <a:rPr lang="pt-BR" sz="4000" b="1" kern="0" spc="180" dirty="0" smtClean="0">
-                <a:solidFill>
-                  <a:schemeClr val="tx1"/>
-                </a:solidFill>
-                <a:latin typeface="Arial"/>
-                <a:cs typeface="Arial"/>
-              </a:rPr>
-              <a:t>A documentação </a:t>
-            </a:r>
-            <a:r>
-              <a:rPr lang="pt-BR" sz="4000" b="1" kern="0" spc="180" dirty="0">
-                <a:solidFill>
-                  <a:schemeClr val="tx1"/>
-                </a:solidFill>
-                <a:latin typeface="Arial"/>
-                <a:cs typeface="Arial"/>
-              </a:rPr>
-              <a:t>da própria Microsoft </a:t>
-            </a:r>
-            <a:r>
-              <a:rPr lang="pt-BR" sz="4000" b="1" kern="0" spc="180" dirty="0" smtClean="0">
-                <a:solidFill>
-                  <a:schemeClr val="tx1"/>
-                </a:solidFill>
-                <a:latin typeface="Arial"/>
-                <a:cs typeface="Arial"/>
-              </a:rPr>
-              <a:t>é um exemplo:</a:t>
-            </a:r>
-          </a:p>
-          <a:p>
-            <a:pPr marL="584200" indent="-571500" algn="just">
-              <a:spcBef>
-                <a:spcPts val="95"/>
-              </a:spcBef>
-              <a:buFont typeface="Wingdings" panose="05000000000000000000" pitchFamily="2" charset="2"/>
-              <a:buChar char="§"/>
-            </a:pPr>
-            <a:r>
-              <a:rPr lang="pt-BR" sz="3200" b="1" kern="0" spc="180" dirty="0">
-                <a:solidFill>
-                  <a:schemeClr val="tx1"/>
-                </a:solidFill>
-                <a:latin typeface="Arial"/>
-                <a:cs typeface="Arial"/>
-                <a:hlinkClick r:id="rId2"/>
-              </a:rPr>
-              <a:t>https://docs.microsoft.com/en-us/dotnet/csharp/tour-of-csharp/</a:t>
-            </a:r>
-            <a:endParaRPr lang="pt-BR" sz="3200" b="1" kern="0" spc="180" dirty="0">
-              <a:solidFill>
-                <a:schemeClr val="tx1"/>
-              </a:solidFill>
-              <a:latin typeface="Arial"/>
-              <a:cs typeface="Arial"/>
-            </a:endParaRPr>
-          </a:p>
-        </p:txBody>
-      </p:sp>
-    </p:spTree>
-    <p:extLst>
-      <p:ext uri="{BB962C8B-B14F-4D97-AF65-F5344CB8AC3E}">
-        <p14:creationId xmlns:p14="http://schemas.microsoft.com/office/powerpoint/2010/main" val="3541934930"/>
-      </p:ext>
-    </p:extLst>
-  </p:cSld>
-  <p:clrMapOvr>
-    <a:masterClrMapping/>
-  </p:clrMapOvr>
-  <p:timing>
-    <p:tnLst>
-      <p:par>
-        <p:cTn id="1" dur="indefinite" restart="never" nodeType="tmRoot"/>
-      </p:par>
-    </p:tnLst>
-  </p:timing>
-</p:sld>
-</file>
-
-<file path=ppt/slides/slide11.xml><?xml version="1.0" encoding="utf-8"?>
-<p:sld xmlns:a="http://schemas.openxmlformats.org/drawingml/2006/main" xmlns:r="http://schemas.openxmlformats.org/officeDocument/2006/relationships" xmlns:p="http://schemas.openxmlformats.org/presentationml/2006/main">
-  <p:cSld>
-    <p:spTree>
-      <p:nvGrpSpPr>
-        <p:cNvPr id="1" name=""/>
-        <p:cNvGrpSpPr/>
-        <p:nvPr/>
-      </p:nvGrpSpPr>
-      <p:grpSpPr>
-        <a:xfrm>
-          <a:off x="0" y="0"/>
-          <a:ext cx="0" cy="0"/>
-          <a:chOff x="0" y="0"/>
-          <a:chExt cx="0" cy="0"/>
-        </a:xfrm>
-      </p:grpSpPr>
-      <p:sp>
-        <p:nvSpPr>
           <p:cNvPr id="2" name="object 2"/>
           <p:cNvSpPr txBox="1">
             <a:spLocks noGrp="1"/>
@@ -4330,7 +3917,27 @@
                 <a:latin typeface="Arial"/>
                 <a:cs typeface="Arial"/>
               </a:rPr>
-              <a:t>Você vai ver que sabendo C# fica fácil aprender outras linguagens que utilizam o mesmo paradigma como C++, Java, </a:t>
+              <a:t>Você vai ver que sabendo C# fica fácil aprender outras linguagens que utilizam o mesmo paradigma como </a:t>
+            </a:r>
+            <a:r>
+              <a:rPr lang="pt-BR" sz="4000" b="1" kern="0" spc="180" dirty="0" smtClean="0">
+                <a:solidFill>
+                  <a:schemeClr val="tx1"/>
+                </a:solidFill>
+                <a:latin typeface="Arial"/>
+                <a:cs typeface="Arial"/>
+              </a:rPr>
+              <a:t>Java</a:t>
+            </a:r>
+            <a:r>
+              <a:rPr lang="pt-BR" sz="4000" b="1" kern="0" spc="180" dirty="0">
+                <a:solidFill>
+                  <a:schemeClr val="tx1"/>
+                </a:solidFill>
+                <a:latin typeface="Arial"/>
+                <a:cs typeface="Arial"/>
+              </a:rPr>
+              <a:t>, </a:t>
             </a:r>
             <a:r>
               <a:rPr lang="pt-BR" sz="4000" b="1" kern="0" spc="180" dirty="0" smtClean="0">
@@ -4800,7 +4407,7 @@
     </p:spTree>
     <p:extLst>
       <p:ext uri="{BB962C8B-B14F-4D97-AF65-F5344CB8AC3E}">
-        <p14:creationId xmlns:p14="http://schemas.microsoft.com/office/powerpoint/2010/main" val="12499909"/>
+        <p14:creationId xmlns:p14="http://schemas.microsoft.com/office/powerpoint/2010/main" val="2138935520"/>
       </p:ext>
     </p:extLst>
   </p:cSld>
@@ -5074,7 +4681,7 @@
         <p:spPr>
           <a:xfrm>
             <a:off x="1179677" y="2247900"/>
-            <a:ext cx="15559939" cy="3115596"/>
+            <a:ext cx="15559939" cy="4962256"/>
           </a:xfrm>
           <a:prstGeom prst="rect">
             <a:avLst/>
@@ -5105,6 +4712,16 @@
               <a:buChar char="§"/>
             </a:pPr>
             <a:r>
+              <a:rPr lang="pt-BR" sz="4000" b="1" kern="0" spc="180" dirty="0" smtClean="0">
+                <a:solidFill>
+                  <a:srgbClr val="92D050"/>
+                </a:solidFill>
+                <a:latin typeface="Arial"/>
+                <a:cs typeface="Arial"/>
+              </a:rPr>
+              <a:t>Comunidade</a:t>
+            </a:r>
+            <a:r>
               <a:rPr lang="pt-BR" sz="4000" b="1" kern="0" spc="180" dirty="0">
                 <a:solidFill>
                   <a:srgbClr val="92D050"/>
@@ -5112,7 +4729,7 @@
                 <a:latin typeface="Arial"/>
                 <a:cs typeface="Arial"/>
               </a:rPr>
-              <a:t>.NET Core:</a:t>
+              <a:t>:</a:t>
             </a:r>
           </a:p>
           <a:p>
@@ -5124,6 +4741,16 @@
               <a:buChar char="§"/>
             </a:pPr>
             <a:r>
+              <a:rPr lang="pt-BR" sz="4000" b="1" kern="0" spc="180" dirty="0">
+                <a:solidFill>
+                  <a:schemeClr val="tx1"/>
+                </a:solidFill>
+                <a:latin typeface="Arial"/>
+                <a:cs typeface="Arial"/>
+              </a:rPr>
+              <a:t>A linguagem foi lançada em </a:t>
+            </a:r>
+            <a:r>
               <a:rPr lang="pt-BR" sz="4000" b="1" kern="0" spc="180" dirty="0" smtClean="0">
                 <a:solidFill>
                   <a:schemeClr val="tx1"/>
@@ -5131,7 +4758,26 @@
                 <a:latin typeface="Arial"/>
                 <a:cs typeface="Arial"/>
               </a:rPr>
-              <a:t>Desenvolvimento de </a:t>
+              <a:t>2001.</a:t>
+            </a:r>
+          </a:p>
+          <a:p>
+            <a:pPr marL="584200" indent="-571500" algn="just">
+              <a:spcBef>
+                <a:spcPts val="95"/>
+              </a:spcBef>
+              <a:buFont typeface="Wingdings" panose="05000000000000000000" pitchFamily="2" charset="2"/>
+              <a:buChar char="§"/>
+            </a:pPr>
+            <a:r>
+              <a:rPr lang="pt-BR" sz="4000" b="1" kern="0" spc="180" dirty="0" smtClean="0">
+                <a:solidFill>
+                  <a:schemeClr val="tx1"/>
+                </a:solidFill>
+                <a:latin typeface="Arial"/>
+                <a:cs typeface="Arial"/>
+              </a:rPr>
+              <a:t>Significa </a:t>
             </a:r>
             <a:r>
               <a:rPr lang="pt-BR" sz="4000" b="1" kern="0" spc="180" dirty="0">
@@ -5141,17 +4787,36 @@
                 <a:latin typeface="Arial"/>
                 <a:cs typeface="Arial"/>
               </a:rPr>
-              <a:t>aplicações </a:t>
-            </a:r>
-            <a:r>
-              <a:rPr lang="pt-BR" sz="4000" b="1" kern="0" spc="180" dirty="0" err="1">
+              <a:t>que muitas pessoas já usaram C# pra resolver muitos problemas. Ou seja: os erros e dificuldades que você tiver com a linguagem, provavelmente alguém já teve e documentou isso em algum lugar.</a:t>
+            </a:r>
+          </a:p>
+          <a:p>
+            <a:pPr marL="584200" indent="-571500" algn="just">
+              <a:spcBef>
+                <a:spcPts val="95"/>
+              </a:spcBef>
+              <a:buFont typeface="Wingdings" panose="05000000000000000000" pitchFamily="2" charset="2"/>
+              <a:buChar char="§"/>
+            </a:pPr>
+            <a:r>
+              <a:rPr lang="pt-BR" sz="4000" b="1" kern="0" spc="180" dirty="0">
                 <a:solidFill>
                   <a:schemeClr val="tx1"/>
                 </a:solidFill>
                 <a:latin typeface="Arial"/>
                 <a:cs typeface="Arial"/>
               </a:rPr>
-              <a:t>multiplataforma</a:t>
+              <a:t>Uma pesquisa rápida no </a:t>
+            </a:r>
+            <a:r>
+              <a:rPr lang="pt-BR" sz="4000" b="1" kern="0" spc="180" dirty="0" smtClean="0">
+                <a:solidFill>
+                  <a:schemeClr val="tx1"/>
+                </a:solidFill>
+                <a:latin typeface="Arial"/>
+                <a:cs typeface="Arial"/>
+              </a:rPr>
+              <a:t>Google </a:t>
             </a:r>
             <a:r>
               <a:rPr lang="pt-BR" sz="4000" b="1" kern="0" spc="180" dirty="0">
@@ -5161,7 +4826,7 @@
                 <a:latin typeface="Arial"/>
                 <a:cs typeface="Arial"/>
               </a:rPr>
-              <a:t> (que funcionam em Linux, Windows e Mac</a:t>
+              <a:t>fará você encontrar o que </a:t>
             </a:r>
             <a:r>
               <a:rPr lang="pt-BR" sz="4000" b="1" kern="0" spc="180" dirty="0" smtClean="0">
@@ -5171,7 +4836,7 @@
                 <a:latin typeface="Arial"/>
                 <a:cs typeface="Arial"/>
               </a:rPr>
-              <a:t>).</a:t>
+              <a:t>precisa.</a:t>
             </a:r>
             <a:endParaRPr lang="pt-BR" sz="4000" b="1" kern="0" spc="180" dirty="0">
               <a:solidFill>
@@ -5181,51 +4846,12 @@
               <a:cs typeface="Arial"/>
             </a:endParaRPr>
           </a:p>
-          <a:p>
-            <a:pPr marL="584200" indent="-571500" algn="just">
-              <a:spcBef>
-                <a:spcPts val="95"/>
-              </a:spcBef>
-              <a:buFont typeface="Wingdings" panose="05000000000000000000" pitchFamily="2" charset="2"/>
-              <a:buChar char="§"/>
-            </a:pPr>
-            <a:r>
-              <a:rPr lang="pt-BR" sz="4000" b="1" kern="0" spc="180" dirty="0">
-                <a:solidFill>
-                  <a:schemeClr val="tx1"/>
-                </a:solidFill>
-                <a:latin typeface="Arial"/>
-                <a:cs typeface="Arial"/>
-              </a:rPr>
-              <a:t>Além de ser </a:t>
-            </a:r>
-            <a:r>
-              <a:rPr lang="pt-BR" sz="4000" b="1" kern="0" spc="180" dirty="0" err="1">
-                <a:solidFill>
-                  <a:schemeClr val="tx1"/>
-                </a:solidFill>
-                <a:latin typeface="Arial"/>
-                <a:cs typeface="Arial"/>
-              </a:rPr>
-              <a:t>multiplataforma</a:t>
-            </a:r>
-            <a:r>
-              <a:rPr lang="pt-BR" sz="4000" b="1" kern="0" spc="180" dirty="0">
-                <a:solidFill>
-                  <a:schemeClr val="tx1"/>
-                </a:solidFill>
-                <a:latin typeface="Arial"/>
-                <a:cs typeface="Arial"/>
-              </a:rPr>
-              <a:t>, o .NET Core é extremamente performático e modular.</a:t>
-            </a:r>
-          </a:p>
         </p:txBody>
       </p:sp>
     </p:spTree>
     <p:extLst>
       <p:ext uri="{BB962C8B-B14F-4D97-AF65-F5344CB8AC3E}">
-        <p14:creationId xmlns:p14="http://schemas.microsoft.com/office/powerpoint/2010/main" val="2138935520"/>
+        <p14:creationId xmlns:p14="http://schemas.microsoft.com/office/powerpoint/2010/main" val="2733140184"/>
       </p:ext>
     </p:extLst>
   </p:cSld>
@@ -5499,7 +5125,7 @@
         <p:spPr>
           <a:xfrm>
             <a:off x="1179677" y="2247900"/>
-            <a:ext cx="15559939" cy="4962256"/>
+            <a:ext cx="15559939" cy="3115596"/>
           </a:xfrm>
           <a:prstGeom prst="rect">
             <a:avLst/>
@@ -5530,6 +5156,16 @@
               <a:buChar char="§"/>
             </a:pPr>
             <a:r>
+              <a:rPr lang="pt-BR" sz="4000" b="1" kern="0" spc="180" dirty="0">
+                <a:solidFill>
+                  <a:srgbClr val="92D050"/>
+                </a:solidFill>
+                <a:latin typeface="Arial"/>
+                <a:cs typeface="Arial"/>
+              </a:rPr>
+              <a:t>A linguagem não </a:t>
+            </a:r>
+            <a:r>
               <a:rPr lang="pt-BR" sz="4000" b="1" kern="0" spc="180" dirty="0" smtClean="0">
                 <a:solidFill>
                   <a:srgbClr val="92D050"/>
@@ -5537,7 +5173,7 @@
                 <a:latin typeface="Arial"/>
                 <a:cs typeface="Arial"/>
               </a:rPr>
-              <a:t>Comunidade</a:t>
+              <a:t>para </a:t>
             </a:r>
             <a:r>
               <a:rPr lang="pt-BR" sz="4000" b="1" kern="0" spc="180" dirty="0">
@@ -5547,7 +5183,7 @@
                 <a:latin typeface="Arial"/>
                 <a:cs typeface="Arial"/>
               </a:rPr>
-              <a:t>:</a:t>
+              <a:t>de evoluir:</a:t>
             </a:r>
           </a:p>
           <a:p>
@@ -5566,7 +5202,7 @@
                 <a:latin typeface="Arial"/>
                 <a:cs typeface="Arial"/>
               </a:rPr>
-              <a:t>A linguagem foi lançada em </a:t>
+              <a:t>A Microsoft trabalha incansavelmente no C</a:t>
             </a:r>
             <a:r>
               <a:rPr lang="pt-BR" sz="4000" b="1" kern="0" spc="180" dirty="0" smtClean="0">
@@ -5576,7 +5212,7 @@
                 <a:latin typeface="Arial"/>
                 <a:cs typeface="Arial"/>
               </a:rPr>
-              <a:t>2001.</a:t>
+              <a:t>#.</a:t>
             </a:r>
           </a:p>
           <a:p>
@@ -5595,7 +5231,7 @@
                 <a:latin typeface="Arial"/>
                 <a:cs typeface="Arial"/>
               </a:rPr>
-              <a:t>Significa </a:t>
+              <a:t>Ela </a:t>
             </a:r>
             <a:r>
               <a:rPr lang="pt-BR" sz="4000" b="1" kern="0" spc="180" dirty="0">
@@ -5605,8 +5241,65 @@
                 <a:latin typeface="Arial"/>
                 <a:cs typeface="Arial"/>
               </a:rPr>
-              <a:t>que muitas pessoas já usaram C# pra resolver muitos problemas. Ou seja: os erros e dificuldades que você tiver com a linguagem, provavelmente alguém já teve e documentou isso em algum lugar.</a:t>
-            </a:r>
+              <a:t>evoluiu nos últimos anos </a:t>
+            </a:r>
+            <a:r>
+              <a:rPr lang="pt-BR" sz="4000" b="1" kern="0" spc="180" dirty="0" smtClean="0">
+                <a:solidFill>
+                  <a:schemeClr val="tx1"/>
+                </a:solidFill>
+                <a:latin typeface="Arial"/>
+                <a:cs typeface="Arial"/>
+              </a:rPr>
+              <a:t>e disponibiliza novos </a:t>
+            </a:r>
+            <a:r>
+              <a:rPr lang="pt-BR" sz="4000" b="1" kern="0" spc="180" dirty="0">
+                <a:solidFill>
+                  <a:schemeClr val="tx1"/>
+                </a:solidFill>
+                <a:latin typeface="Arial"/>
+                <a:cs typeface="Arial"/>
+              </a:rPr>
+              <a:t>recursos </a:t>
+            </a:r>
+            <a:r>
+              <a:rPr lang="pt-BR" sz="4000" b="1" kern="0" spc="180" dirty="0" smtClean="0">
+                <a:solidFill>
+                  <a:schemeClr val="tx1"/>
+                </a:solidFill>
+                <a:latin typeface="Arial"/>
+                <a:cs typeface="Arial"/>
+              </a:rPr>
+              <a:t>a cada </a:t>
+            </a:r>
+            <a:r>
+              <a:rPr lang="pt-BR" sz="4000" b="1" kern="0" spc="180" dirty="0">
+                <a:solidFill>
+                  <a:schemeClr val="tx1"/>
+                </a:solidFill>
+                <a:latin typeface="Arial"/>
+                <a:cs typeface="Arial"/>
+              </a:rPr>
+              <a:t>versão lançada</a:t>
+            </a:r>
+            <a:r>
+              <a:rPr lang="pt-BR" sz="4000" b="1" kern="0" spc="180" dirty="0" smtClean="0">
+                <a:solidFill>
+                  <a:schemeClr val="tx1"/>
+                </a:solidFill>
+                <a:latin typeface="Arial"/>
+                <a:cs typeface="Arial"/>
+              </a:rPr>
+              <a:t>.</a:t>
+            </a:r>
+            <a:endParaRPr lang="pt-BR" sz="4000" b="1" kern="0" spc="180" dirty="0">
+              <a:solidFill>
+                <a:schemeClr val="tx1"/>
+              </a:solidFill>
+              <a:latin typeface="Arial"/>
+              <a:cs typeface="Arial"/>
+            </a:endParaRPr>
           </a:p>
           <a:p>
             <a:pPr marL="584200" indent="-571500" algn="just">
@@ -5624,52 +5317,15 @@
                 <a:latin typeface="Arial"/>
                 <a:cs typeface="Arial"/>
               </a:rPr>
-              <a:t>Uma pesquisa rápida no </a:t>
-            </a:r>
-            <a:r>
-              <a:rPr lang="pt-BR" sz="4000" b="1" kern="0" spc="180" dirty="0" smtClean="0">
-                <a:solidFill>
-                  <a:schemeClr val="tx1"/>
-                </a:solidFill>
-                <a:latin typeface="Arial"/>
-                <a:cs typeface="Arial"/>
-              </a:rPr>
-              <a:t>Google </a:t>
-            </a:r>
-            <a:r>
-              <a:rPr lang="pt-BR" sz="4000" b="1" kern="0" spc="180" dirty="0">
-                <a:solidFill>
-                  <a:schemeClr val="tx1"/>
-                </a:solidFill>
-                <a:latin typeface="Arial"/>
-                <a:cs typeface="Arial"/>
-              </a:rPr>
-              <a:t>fará você encontrar o que </a:t>
-            </a:r>
-            <a:r>
-              <a:rPr lang="pt-BR" sz="4000" b="1" kern="0" spc="180" dirty="0" smtClean="0">
-                <a:solidFill>
-                  <a:schemeClr val="tx1"/>
-                </a:solidFill>
-                <a:latin typeface="Arial"/>
-                <a:cs typeface="Arial"/>
-              </a:rPr>
-              <a:t>precisa.</a:t>
-            </a:r>
-            <a:endParaRPr lang="pt-BR" sz="4000" b="1" kern="0" spc="180" dirty="0">
-              <a:solidFill>
-                <a:schemeClr val="tx1"/>
-              </a:solidFill>
-              <a:latin typeface="Arial"/>
-              <a:cs typeface="Arial"/>
-            </a:endParaRPr>
+              <a:t>C# não está nem perto de deixar de ser popular.</a:t>
+            </a:r>
           </a:p>
         </p:txBody>
       </p:sp>
     </p:spTree>
     <p:extLst>
       <p:ext uri="{BB962C8B-B14F-4D97-AF65-F5344CB8AC3E}">
-        <p14:creationId xmlns:p14="http://schemas.microsoft.com/office/powerpoint/2010/main" val="2733140184"/>
+        <p14:creationId xmlns:p14="http://schemas.microsoft.com/office/powerpoint/2010/main" val="228964397"/>
       </p:ext>
     </p:extLst>
   </p:cSld>
@@ -5943,7 +5599,7 @@
         <p:spPr>
           <a:xfrm>
             <a:off x="1179677" y="2247900"/>
-            <a:ext cx="15559939" cy="3115596"/>
+            <a:ext cx="15559939" cy="3005310"/>
           </a:xfrm>
           <a:prstGeom prst="rect">
             <a:avLst/>
@@ -5981,27 +5637,7 @@
                 <a:latin typeface="Arial"/>
                 <a:cs typeface="Arial"/>
               </a:rPr>
-              <a:t>A linguagem não </a:t>
-            </a:r>
-            <a:r>
-              <a:rPr lang="pt-BR" sz="4000" b="1" kern="0" spc="180" dirty="0" smtClean="0">
-                <a:solidFill>
-                  <a:srgbClr val="92D050"/>
-                </a:solidFill>
-                <a:latin typeface="Arial"/>
-                <a:cs typeface="Arial"/>
-              </a:rPr>
-              <a:t>para </a:t>
-            </a:r>
-            <a:r>
-              <a:rPr lang="pt-BR" sz="4000" b="1" kern="0" spc="180" dirty="0">
-                <a:solidFill>
-                  <a:srgbClr val="92D050"/>
-                </a:solidFill>
-                <a:latin typeface="Arial"/>
-                <a:cs typeface="Arial"/>
-              </a:rPr>
-              <a:t>de evoluir:</a:t>
+              <a:t>Muitos lugares para aprender:</a:t>
             </a:r>
           </a:p>
           <a:p>
@@ -6020,18 +5656,15 @@
                 <a:latin typeface="Arial"/>
                 <a:cs typeface="Arial"/>
               </a:rPr>
-              <a:t>A Microsoft trabalha incansavelmente no C</a:t>
-            </a:r>
-            <a:r>
-              <a:rPr lang="pt-BR" sz="4000" b="1" kern="0" spc="180" dirty="0" smtClean="0">
-                <a:solidFill>
-                  <a:schemeClr val="tx1"/>
-                </a:solidFill>
-                <a:latin typeface="Arial"/>
-                <a:cs typeface="Arial"/>
-              </a:rPr>
-              <a:t>#.</a:t>
-            </a:r>
+              <a:t>Você pode começar a estudar C# em vários lugares diferentes, de graça. </a:t>
+            </a:r>
+            <a:endParaRPr lang="pt-BR" sz="4000" b="1" kern="0" spc="180" dirty="0" smtClean="0">
+              <a:solidFill>
+                <a:schemeClr val="tx1"/>
+              </a:solidFill>
+              <a:latin typeface="Arial"/>
+              <a:cs typeface="Arial"/>
+            </a:endParaRPr>
           </a:p>
           <a:p>
             <a:pPr marL="584200" indent="-571500" algn="just">
@@ -6049,7 +5682,7 @@
                 <a:latin typeface="Arial"/>
                 <a:cs typeface="Arial"/>
               </a:rPr>
-              <a:t>Ela </a:t>
+              <a:t>A documentação </a:t>
             </a:r>
             <a:r>
               <a:rPr lang="pt-BR" sz="4000" b="1" kern="0" spc="180" dirty="0">
@@ -6059,7 +5692,7 @@
                 <a:latin typeface="Arial"/>
                 <a:cs typeface="Arial"/>
               </a:rPr>
-              <a:t>evoluiu nos últimos anos </a:t>
+              <a:t>da própria Microsoft </a:t>
             </a:r>
             <a:r>
               <a:rPr lang="pt-BR" sz="4000" b="1" kern="0" spc="180" dirty="0" smtClean="0">
@@ -6069,55 +5702,8 @@
                 <a:latin typeface="Arial"/>
                 <a:cs typeface="Arial"/>
               </a:rPr>
-              <a:t>e disponibiliza novos </a:t>
-            </a:r>
-            <a:r>
-              <a:rPr lang="pt-BR" sz="4000" b="1" kern="0" spc="180" dirty="0">
-                <a:solidFill>
-                  <a:schemeClr val="tx1"/>
-                </a:solidFill>
-                <a:latin typeface="Arial"/>
-                <a:cs typeface="Arial"/>
-              </a:rPr>
-              <a:t>recursos </a:t>
-            </a:r>
-            <a:r>
-              <a:rPr lang="pt-BR" sz="4000" b="1" kern="0" spc="180" dirty="0" smtClean="0">
-                <a:solidFill>
-                  <a:schemeClr val="tx1"/>
-                </a:solidFill>
-                <a:latin typeface="Arial"/>
-                <a:cs typeface="Arial"/>
-              </a:rPr>
-              <a:t>a cada </a:t>
-            </a:r>
-            <a:r>
-              <a:rPr lang="pt-BR" sz="4000" b="1" kern="0" spc="180" dirty="0">
-                <a:solidFill>
-                  <a:schemeClr val="tx1"/>
-                </a:solidFill>
-                <a:latin typeface="Arial"/>
-                <a:cs typeface="Arial"/>
-              </a:rPr>
-              <a:t>versão lançada</a:t>
-            </a:r>
-            <a:r>
-              <a:rPr lang="pt-BR" sz="4000" b="1" kern="0" spc="180" dirty="0" smtClean="0">
-                <a:solidFill>
-                  <a:schemeClr val="tx1"/>
-                </a:solidFill>
-                <a:latin typeface="Arial"/>
-                <a:cs typeface="Arial"/>
-              </a:rPr>
-              <a:t>.</a:t>
-            </a:r>
-            <a:endParaRPr lang="pt-BR" sz="4000" b="1" kern="0" spc="180" dirty="0">
-              <a:solidFill>
-                <a:schemeClr val="tx1"/>
-              </a:solidFill>
-              <a:latin typeface="Arial"/>
-              <a:cs typeface="Arial"/>
-            </a:endParaRPr>
+              <a:t>é um exemplo:</a:t>
+            </a:r>
           </a:p>
           <a:p>
             <a:pPr marL="584200" indent="-571500" algn="just">
@@ -6128,22 +5714,30 @@
               <a:buChar char="§"/>
             </a:pPr>
             <a:r>
-              <a:rPr lang="pt-BR" sz="4000" b="1" kern="0" spc="180" dirty="0">
+              <a:rPr lang="pt-BR" sz="3200" b="1" kern="0" spc="180" dirty="0">
                 <a:solidFill>
                   <a:schemeClr val="tx1"/>
                 </a:solidFill>
                 <a:latin typeface="Arial"/>
                 <a:cs typeface="Arial"/>
-              </a:rPr>
-              <a:t>C# não está nem perto de deixar de ser popular.</a:t>
-            </a:r>
+                <a:hlinkClick r:id="rId2"/>
+              </a:rPr>
+              <a:t>https://docs.microsoft.com/en-us/dotnet/csharp/tour-of-csharp/</a:t>
+            </a:r>
+            <a:endParaRPr lang="pt-BR" sz="3200" b="1" kern="0" spc="180" dirty="0">
+              <a:solidFill>
+                <a:schemeClr val="tx1"/>
+              </a:solidFill>
+              <a:latin typeface="Arial"/>
+              <a:cs typeface="Arial"/>
+            </a:endParaRPr>
           </a:p>
         </p:txBody>
       </p:sp>
     </p:spTree>
     <p:extLst>
       <p:ext uri="{BB962C8B-B14F-4D97-AF65-F5344CB8AC3E}">
-        <p14:creationId xmlns:p14="http://schemas.microsoft.com/office/powerpoint/2010/main" val="228964397"/>
+        <p14:creationId xmlns:p14="http://schemas.microsoft.com/office/powerpoint/2010/main" val="3541934930"/>
       </p:ext>
     </p:extLst>
   </p:cSld>

</xml_diff>